<commit_message>
Updated presentation slides for journal article critique
</commit_message>
<xml_diff>
--- a/Presentations/Presentation01/AsiriHouseTownes_SOC6100_JournalArticleCritique.pptx
+++ b/Presentations/Presentation01/AsiriHouseTownes_SOC6100_JournalArticleCritique.pptx
@@ -1420,8 +1420,8 @@
     <dgm:cxn modelId="{94545DFE-9D87-44D7-B09F-172240A7DFD6}" srcId="{D19434F5-8BA7-42A5-B06E-2A622BED50C2}" destId="{5E378D90-3C64-4F54-9EAF-339B3B633069}" srcOrd="3" destOrd="0" parTransId="{712EDBB5-B940-432F-9757-B048E08F8546}" sibTransId="{C0054E9D-D1A6-4E64-A302-AD66D9DD0AA0}"/>
     <dgm:cxn modelId="{A9F6E0FC-ABF1-4B15-8D87-0D429A78CC20}" type="presOf" srcId="{6CD38410-63FE-49E8-A15F-43113B579FC4}" destId="{599AE2E8-45C3-4D8A-9228-B6EB827C01EB}" srcOrd="0" destOrd="0" presId="urn:microsoft.com/office/officeart/2005/8/layout/vList2"/>
     <dgm:cxn modelId="{653864B4-F740-428D-BAC3-ECD6B652EC67}" type="presOf" srcId="{B8C5F0A9-8B0B-4F25-A41F-C13262A97A82}" destId="{BB8AE1D7-93E2-4F7D-95A0-24893BD88B49}" srcOrd="0" destOrd="0" presId="urn:microsoft.com/office/officeart/2005/8/layout/vList2"/>
+    <dgm:cxn modelId="{1A40E00B-C2F3-4051-BDAA-0C0854E02222}" type="presOf" srcId="{EAA145E7-7044-408B-8F38-CB9585C30432}" destId="{90A7ECFA-C3F0-4249-88F6-F725A55CB44A}" srcOrd="0" destOrd="2" presId="urn:microsoft.com/office/officeart/2005/8/layout/vList2"/>
     <dgm:cxn modelId="{19802695-09B6-4A61-A02B-2946680F8901}" srcId="{B8C5F0A9-8B0B-4F25-A41F-C13262A97A82}" destId="{1C9ABC7F-5385-42E3-8133-66E6895E84BA}" srcOrd="0" destOrd="0" parTransId="{6F8535C0-9F19-4BAF-A5B1-04193E3FD565}" sibTransId="{C68F268B-AD5F-46C5-854B-5C0215A6935F}"/>
-    <dgm:cxn modelId="{1A40E00B-C2F3-4051-BDAA-0C0854E02222}" type="presOf" srcId="{EAA145E7-7044-408B-8F38-CB9585C30432}" destId="{90A7ECFA-C3F0-4249-88F6-F725A55CB44A}" srcOrd="0" destOrd="2" presId="urn:microsoft.com/office/officeart/2005/8/layout/vList2"/>
     <dgm:cxn modelId="{55496AFF-0341-4E33-B3BD-4A318C027C4F}" srcId="{D19434F5-8BA7-42A5-B06E-2A622BED50C2}" destId="{6CD38410-63FE-49E8-A15F-43113B579FC4}" srcOrd="2" destOrd="0" parTransId="{1B449093-E713-434B-9FEF-C48394D097DD}" sibTransId="{AB28A93F-DD8D-4798-A5EA-7B51DD175AAC}"/>
     <dgm:cxn modelId="{50CA1C2B-40BB-42D2-BDDA-117086E5C741}" type="presParOf" srcId="{E32AB43C-F7CF-45AC-88A2-FE48D30B914D}" destId="{8BB89208-568D-4CB0-BB01-1D5CE9E2C6EE}" srcOrd="0" destOrd="0" presId="urn:microsoft.com/office/officeart/2005/8/layout/vList2"/>
     <dgm:cxn modelId="{180E2E21-D07C-44CE-A452-5C6FC833A887}" type="presParOf" srcId="{E32AB43C-F7CF-45AC-88A2-FE48D30B914D}" destId="{0CD346E0-8734-438E-982D-85C38298B913}" srcOrd="1" destOrd="0" presId="urn:microsoft.com/office/officeart/2005/8/layout/vList2"/>
@@ -3699,7 +3699,7 @@
           <a:p>
             <a:fld id="{235D0C9C-FE04-4D2F-A570-BCEF9F25AF09}" type="datetimeFigureOut">
               <a:rPr lang="en-US" smtClean="0"/>
-              <a:t>10/04/2018</a:t>
+              <a:t>10/05/2018</a:t>
             </a:fld>
             <a:endParaRPr lang="en-US"/>
           </a:p>
@@ -5203,7 +5203,7 @@
           <a:p>
             <a:fld id="{B2FFD341-8149-4AD4-87F3-AEC054F0F59C}" type="datetime1">
               <a:rPr lang="en-US" smtClean="0"/>
-              <a:t>10/04/2018</a:t>
+              <a:t>10/05/2018</a:t>
             </a:fld>
             <a:endParaRPr lang="en-US"/>
           </a:p>
@@ -5373,7 +5373,7 @@
           <a:p>
             <a:fld id="{35BF5644-C4CF-4457-B8F6-80F8DE2B3631}" type="datetime1">
               <a:rPr lang="en-US" smtClean="0"/>
-              <a:t>10/04/2018</a:t>
+              <a:t>10/05/2018</a:t>
             </a:fld>
             <a:endParaRPr lang="en-US"/>
           </a:p>
@@ -5553,7 +5553,7 @@
           <a:p>
             <a:fld id="{C5F5701A-7247-4BB3-9857-4874B0EE95CC}" type="datetime1">
               <a:rPr lang="en-US" smtClean="0"/>
-              <a:t>10/04/2018</a:t>
+              <a:t>10/05/2018</a:t>
             </a:fld>
             <a:endParaRPr lang="en-US"/>
           </a:p>
@@ -5723,7 +5723,7 @@
           <a:p>
             <a:fld id="{E0C6374D-BF12-4096-87A0-807717C03C3A}" type="datetime1">
               <a:rPr lang="en-US" smtClean="0"/>
-              <a:t>10/04/2018</a:t>
+              <a:t>10/05/2018</a:t>
             </a:fld>
             <a:endParaRPr lang="en-US"/>
           </a:p>
@@ -5969,7 +5969,7 @@
           <a:p>
             <a:fld id="{10EE01A5-6BAC-4216-A3C1-D43C9A2EC80E}" type="datetime1">
               <a:rPr lang="en-US" smtClean="0"/>
-              <a:t>10/04/2018</a:t>
+              <a:t>10/05/2018</a:t>
             </a:fld>
             <a:endParaRPr lang="en-US"/>
           </a:p>
@@ -6257,7 +6257,7 @@
           <a:p>
             <a:fld id="{8AA9849E-5DEC-4E07-BF18-7D0B479A97D2}" type="datetime1">
               <a:rPr lang="en-US" smtClean="0"/>
-              <a:t>10/04/2018</a:t>
+              <a:t>10/05/2018</a:t>
             </a:fld>
             <a:endParaRPr lang="en-US"/>
           </a:p>
@@ -6679,7 +6679,7 @@
           <a:p>
             <a:fld id="{F79C108E-7010-4C3B-BA6A-9614441F7151}" type="datetime1">
               <a:rPr lang="en-US" smtClean="0"/>
-              <a:t>10/04/2018</a:t>
+              <a:t>10/05/2018</a:t>
             </a:fld>
             <a:endParaRPr lang="en-US"/>
           </a:p>
@@ -6797,7 +6797,7 @@
           <a:p>
             <a:fld id="{13DC3AC4-8878-407A-B790-4FCD41475D37}" type="datetime1">
               <a:rPr lang="en-US" smtClean="0"/>
-              <a:t>10/04/2018</a:t>
+              <a:t>10/05/2018</a:t>
             </a:fld>
             <a:endParaRPr lang="en-US"/>
           </a:p>
@@ -6892,7 +6892,7 @@
           <a:p>
             <a:fld id="{554E297D-E0E0-4553-AEAE-30AFEB1DD1B5}" type="datetime1">
               <a:rPr lang="en-US" smtClean="0"/>
-              <a:t>10/04/2018</a:t>
+              <a:t>10/05/2018</a:t>
             </a:fld>
             <a:endParaRPr lang="en-US"/>
           </a:p>
@@ -7169,7 +7169,7 @@
           <a:p>
             <a:fld id="{BD274C2E-B22F-43F1-9703-96990825B5DD}" type="datetime1">
               <a:rPr lang="en-US" smtClean="0"/>
-              <a:t>10/04/2018</a:t>
+              <a:t>10/05/2018</a:t>
             </a:fld>
             <a:endParaRPr lang="en-US"/>
           </a:p>
@@ -7422,7 +7422,7 @@
           <a:p>
             <a:fld id="{20B8AA96-18A4-42B8-BE13-E473D0F459F8}" type="datetime1">
               <a:rPr lang="en-US" smtClean="0"/>
-              <a:t>10/04/2018</a:t>
+              <a:t>10/05/2018</a:t>
             </a:fld>
             <a:endParaRPr lang="en-US"/>
           </a:p>
@@ -7635,7 +7635,7 @@
           <a:p>
             <a:fld id="{40DA1FD4-43F9-4E19-B925-BCCD6E240E7E}" type="datetime1">
               <a:rPr lang="en-US" smtClean="0"/>
-              <a:t>10/04/2018</a:t>
+              <a:t>10/05/2018</a:t>
             </a:fld>
             <a:endParaRPr lang="en-US"/>
           </a:p>
@@ -8073,11 +8073,7 @@
           <a:p>
             <a:r>
               <a:rPr lang="en-US" dirty="0" smtClean="0"/>
-              <a:t>Nathaniel </a:t>
-            </a:r>
-            <a:r>
-              <a:rPr lang="en-US" dirty="0" smtClean="0"/>
-              <a:t>House</a:t>
+              <a:t>Nathaniel House</a:t>
             </a:r>
           </a:p>
           <a:p>
@@ -8380,14 +8376,21 @@
                 <a:latin typeface="Times New Roman"/>
                 <a:cs typeface="Times New Roman"/>
               </a:rPr>
-              <a:t>ageTLO</a:t>
+              <a:t>TLOage</a:t>
             </a:r>
             <a:r>
               <a:rPr lang="en-US" dirty="0" smtClean="0">
                 <a:latin typeface="Times New Roman"/>
                 <a:cs typeface="Times New Roman"/>
               </a:rPr>
-              <a:t>) + </a:t>
+              <a:t>) </a:t>
+            </a:r>
+            <a:r>
+              <a:rPr lang="en-US" dirty="0" smtClean="0">
+                <a:latin typeface="Times New Roman"/>
+                <a:cs typeface="Times New Roman"/>
+              </a:rPr>
+              <a:t>+ </a:t>
             </a:r>
             <a:r>
               <a:rPr lang="el-GR" dirty="0" smtClean="0">
@@ -8415,14 +8418,21 @@
                 <a:latin typeface="Times New Roman"/>
                 <a:cs typeface="Times New Roman"/>
               </a:rPr>
-              <a:t>sizeTLO</a:t>
+              <a:t>TLOsize</a:t>
             </a:r>
             <a:r>
               <a:rPr lang="en-US" dirty="0" smtClean="0">
                 <a:latin typeface="Times New Roman"/>
                 <a:cs typeface="Times New Roman"/>
               </a:rPr>
-              <a:t>) + </a:t>
+              <a:t>) </a:t>
+            </a:r>
+            <a:r>
+              <a:rPr lang="en-US" dirty="0" smtClean="0">
+                <a:latin typeface="Times New Roman"/>
+                <a:cs typeface="Times New Roman"/>
+              </a:rPr>
+              <a:t>+ </a:t>
             </a:r>
             <a:r>
               <a:rPr lang="el-GR" dirty="0" smtClean="0">
@@ -8621,14 +8631,21 @@
                 <a:latin typeface="Times New Roman"/>
                 <a:cs typeface="Times New Roman"/>
               </a:rPr>
-              <a:t>ageTLO</a:t>
+              <a:t>TLOage</a:t>
             </a:r>
             <a:r>
               <a:rPr lang="en-US" dirty="0" smtClean="0">
                 <a:latin typeface="Times New Roman"/>
                 <a:cs typeface="Times New Roman"/>
               </a:rPr>
-              <a:t>) + </a:t>
+              <a:t>) </a:t>
+            </a:r>
+            <a:r>
+              <a:rPr lang="en-US" dirty="0" smtClean="0">
+                <a:latin typeface="Times New Roman"/>
+                <a:cs typeface="Times New Roman"/>
+              </a:rPr>
+              <a:t>+ </a:t>
             </a:r>
             <a:r>
               <a:rPr lang="el-GR" dirty="0" smtClean="0">
@@ -8656,14 +8673,21 @@
                 <a:latin typeface="Times New Roman"/>
                 <a:cs typeface="Times New Roman"/>
               </a:rPr>
-              <a:t>sizeTLO</a:t>
+              <a:t>TLOsize</a:t>
             </a:r>
             <a:r>
               <a:rPr lang="en-US" dirty="0" smtClean="0">
                 <a:latin typeface="Times New Roman"/>
                 <a:cs typeface="Times New Roman"/>
               </a:rPr>
-              <a:t>) + </a:t>
+              <a:t>) </a:t>
+            </a:r>
+            <a:r>
+              <a:rPr lang="en-US" dirty="0" smtClean="0">
+                <a:latin typeface="Times New Roman"/>
+                <a:cs typeface="Times New Roman"/>
+              </a:rPr>
+              <a:t>+ </a:t>
             </a:r>
             <a:r>
               <a:rPr lang="el-GR" dirty="0" smtClean="0">
@@ -8862,14 +8886,21 @@
                 <a:latin typeface="Times New Roman"/>
                 <a:cs typeface="Times New Roman"/>
               </a:rPr>
-              <a:t>ageTLO</a:t>
+              <a:t>TLOage</a:t>
             </a:r>
             <a:r>
               <a:rPr lang="en-US" dirty="0" smtClean="0">
                 <a:latin typeface="Times New Roman"/>
                 <a:cs typeface="Times New Roman"/>
               </a:rPr>
-              <a:t>) + </a:t>
+              <a:t>) </a:t>
+            </a:r>
+            <a:r>
+              <a:rPr lang="en-US" dirty="0" smtClean="0">
+                <a:latin typeface="Times New Roman"/>
+                <a:cs typeface="Times New Roman"/>
+              </a:rPr>
+              <a:t>+ </a:t>
             </a:r>
             <a:r>
               <a:rPr lang="el-GR" dirty="0" smtClean="0">
@@ -8897,14 +8928,21 @@
                 <a:latin typeface="Times New Roman"/>
                 <a:cs typeface="Times New Roman"/>
               </a:rPr>
-              <a:t>sizeTLO</a:t>
+              <a:t>TLOsize</a:t>
             </a:r>
             <a:r>
               <a:rPr lang="en-US" dirty="0" smtClean="0">
                 <a:latin typeface="Times New Roman"/>
                 <a:cs typeface="Times New Roman"/>
               </a:rPr>
-              <a:t>) + </a:t>
+              <a:t>) </a:t>
+            </a:r>
+            <a:r>
+              <a:rPr lang="en-US" dirty="0" smtClean="0">
+                <a:latin typeface="Times New Roman"/>
+                <a:cs typeface="Times New Roman"/>
+              </a:rPr>
+              <a:t>+ </a:t>
             </a:r>
             <a:r>
               <a:rPr lang="el-GR" dirty="0" smtClean="0">
@@ -9340,7 +9378,7 @@
                 <a:latin typeface="Times New Roman"/>
                 <a:cs typeface="Times New Roman"/>
               </a:rPr>
-              <a:t>compInv</a:t>
+              <a:t>payInventors</a:t>
             </a:r>
             <a:r>
               <a:rPr lang="en-US" dirty="0" smtClean="0">
@@ -9350,7 +9388,17 @@
                 <a:latin typeface="Times New Roman"/>
                 <a:cs typeface="Times New Roman"/>
               </a:rPr>
-              <a:t>) +  </a:t>
+              <a:t>) </a:t>
+            </a:r>
+            <a:r>
+              <a:rPr lang="en-US" dirty="0" smtClean="0">
+                <a:solidFill>
+                  <a:prstClr val="black"/>
+                </a:solidFill>
+                <a:latin typeface="Times New Roman"/>
+                <a:cs typeface="Times New Roman"/>
+              </a:rPr>
+              <a:t>+  </a:t>
             </a:r>
             <a:r>
               <a:rPr lang="el-GR" dirty="0" smtClean="0">
@@ -9390,7 +9438,7 @@
                 <a:latin typeface="Times New Roman"/>
                 <a:cs typeface="Times New Roman"/>
               </a:rPr>
-              <a:t>compDept</a:t>
+              <a:t>payDept</a:t>
             </a:r>
             <a:r>
               <a:rPr lang="en-US" dirty="0" smtClean="0">
@@ -9450,7 +9498,7 @@
                 <a:latin typeface="Times New Roman"/>
                 <a:cs typeface="Times New Roman"/>
               </a:rPr>
-              <a:t>compTLO</a:t>
+              <a:t>payTLO</a:t>
             </a:r>
             <a:r>
               <a:rPr lang="en-US" dirty="0" smtClean="0">
@@ -9561,14 +9609,21 @@
                 <a:latin typeface="Times New Roman"/>
                 <a:cs typeface="Times New Roman"/>
               </a:rPr>
-              <a:t>ageTLO</a:t>
+              <a:t>TLOage</a:t>
             </a:r>
             <a:r>
               <a:rPr lang="en-US" dirty="0" smtClean="0">
                 <a:latin typeface="Times New Roman"/>
                 <a:cs typeface="Times New Roman"/>
               </a:rPr>
-              <a:t>) + </a:t>
+              <a:t>) </a:t>
+            </a:r>
+            <a:r>
+              <a:rPr lang="en-US" dirty="0" smtClean="0">
+                <a:latin typeface="Times New Roman"/>
+                <a:cs typeface="Times New Roman"/>
+              </a:rPr>
+              <a:t>+ </a:t>
             </a:r>
             <a:r>
               <a:rPr lang="el-GR" dirty="0" smtClean="0">
@@ -9596,14 +9651,21 @@
                 <a:latin typeface="Times New Roman"/>
                 <a:cs typeface="Times New Roman"/>
               </a:rPr>
-              <a:t>sizeTLO</a:t>
+              <a:t>TLOsize</a:t>
             </a:r>
             <a:r>
               <a:rPr lang="en-US" dirty="0" smtClean="0">
                 <a:latin typeface="Times New Roman"/>
                 <a:cs typeface="Times New Roman"/>
               </a:rPr>
-              <a:t>) + </a:t>
+              <a:t>) </a:t>
+            </a:r>
+            <a:r>
+              <a:rPr lang="en-US" dirty="0" smtClean="0">
+                <a:latin typeface="Times New Roman"/>
+                <a:cs typeface="Times New Roman"/>
+              </a:rPr>
+              <a:t>+ </a:t>
             </a:r>
             <a:r>
               <a:rPr lang="el-GR" dirty="0" smtClean="0">
@@ -10039,7 +10101,7 @@
                 <a:latin typeface="Times New Roman"/>
                 <a:cs typeface="Times New Roman"/>
               </a:rPr>
-              <a:t>compInv</a:t>
+              <a:t>payInventors</a:t>
             </a:r>
             <a:r>
               <a:rPr lang="en-US" dirty="0" smtClean="0">
@@ -10049,7 +10111,17 @@
                 <a:latin typeface="Times New Roman"/>
                 <a:cs typeface="Times New Roman"/>
               </a:rPr>
-              <a:t>) +  </a:t>
+              <a:t>) </a:t>
+            </a:r>
+            <a:r>
+              <a:rPr lang="en-US" dirty="0" smtClean="0">
+                <a:solidFill>
+                  <a:prstClr val="black"/>
+                </a:solidFill>
+                <a:latin typeface="Times New Roman"/>
+                <a:cs typeface="Times New Roman"/>
+              </a:rPr>
+              <a:t>+  </a:t>
             </a:r>
             <a:r>
               <a:rPr lang="el-GR" dirty="0" smtClean="0">
@@ -10089,7 +10161,7 @@
                 <a:latin typeface="Times New Roman"/>
                 <a:cs typeface="Times New Roman"/>
               </a:rPr>
-              <a:t>compDept</a:t>
+              <a:t>payDept</a:t>
             </a:r>
             <a:r>
               <a:rPr lang="en-US" dirty="0" smtClean="0">
@@ -10149,7 +10221,7 @@
                 <a:latin typeface="Times New Roman"/>
                 <a:cs typeface="Times New Roman"/>
               </a:rPr>
-              <a:t>compTLO</a:t>
+              <a:t>payTLO</a:t>
             </a:r>
             <a:r>
               <a:rPr lang="en-US" dirty="0" smtClean="0">
@@ -10371,8 +10443,8 @@
         </p:blipFill>
         <p:spPr bwMode="auto">
           <a:xfrm>
-            <a:off x="1645287" y="571500"/>
-            <a:ext cx="5853426" cy="4572000"/>
+            <a:off x="2057400" y="893394"/>
+            <a:ext cx="5029200" cy="3928213"/>
           </a:xfrm>
           <a:prstGeom prst="rect">
             <a:avLst/>
@@ -10799,13 +10871,8 @@
             </a:pPr>
             <a:r>
               <a:rPr lang="en-US" dirty="0" smtClean="0"/>
-              <a:t>Study the role of research universities as suppliers of </a:t>
-            </a:r>
-            <a:r>
-              <a:rPr lang="en-US" dirty="0" smtClean="0"/>
-              <a:t>innovations.</a:t>
-            </a:r>
-            <a:endParaRPr lang="en-US" dirty="0" smtClean="0"/>
+              <a:t>Study the role of research universities as suppliers of innovations.</a:t>
+            </a:r>
           </a:p>
           <a:p>
             <a:pPr marL="342900" indent="-342900">
@@ -11854,7 +11921,7 @@
           </p:nvSpPr>
           <p:spPr>
             <a:xfrm>
-              <a:off x="3639218" y="1341120"/>
+              <a:off x="3639218" y="1291112"/>
               <a:ext cx="1828800" cy="548640"/>
             </a:xfrm>
             <a:prstGeom prst="rect">
@@ -11922,7 +11989,7 @@
           </p:nvSpPr>
           <p:spPr>
             <a:xfrm>
-              <a:off x="3639218" y="628650"/>
+              <a:off x="3639218" y="678658"/>
               <a:ext cx="1828800" cy="548640"/>
             </a:xfrm>
             <a:prstGeom prst="rect">
@@ -11987,7 +12054,7 @@
           </p:nvSpPr>
           <p:spPr>
             <a:xfrm>
-              <a:off x="3959258" y="1889760"/>
+              <a:off x="3959258" y="1846896"/>
               <a:ext cx="1188720" cy="369332"/>
             </a:xfrm>
             <a:prstGeom prst="rect">
@@ -12018,7 +12085,7 @@
           </p:nvSpPr>
           <p:spPr>
             <a:xfrm>
-              <a:off x="3776378" y="264795"/>
+              <a:off x="3776378" y="307659"/>
               <a:ext cx="1554480" cy="365760"/>
             </a:xfrm>
             <a:prstGeom prst="rect">
@@ -13227,7 +13294,11 @@
           <a:p>
             <a:r>
               <a:rPr lang="en-US" dirty="0" err="1" smtClean="0"/>
-              <a:t>compInv</a:t>
+              <a:t>pay</a:t>
+            </a:r>
+            <a:r>
+              <a:rPr lang="en-US" dirty="0" err="1" smtClean="0"/>
+              <a:t>Inventors</a:t>
             </a:r>
             <a:r>
               <a:rPr lang="en-US" dirty="0" smtClean="0"/>
@@ -13257,7 +13328,11 @@
           <a:p>
             <a:r>
               <a:rPr lang="en-US" dirty="0" err="1" smtClean="0"/>
-              <a:t>compDept</a:t>
+              <a:t>pay</a:t>
+            </a:r>
+            <a:r>
+              <a:rPr lang="en-US" dirty="0" err="1" smtClean="0"/>
+              <a:t>Dept</a:t>
             </a:r>
             <a:r>
               <a:rPr lang="en-US" dirty="0" smtClean="0"/>
@@ -13287,7 +13362,11 @@
           <a:p>
             <a:r>
               <a:rPr lang="en-US" dirty="0" err="1" smtClean="0"/>
-              <a:t>compTLO</a:t>
+              <a:t>pay</a:t>
+            </a:r>
+            <a:r>
+              <a:rPr lang="en-US" dirty="0" err="1" smtClean="0"/>
+              <a:t>TLO</a:t>
             </a:r>
             <a:r>
               <a:rPr lang="en-US" dirty="0" smtClean="0"/>
@@ -13325,7 +13404,40 @@
           <a:p>
             <a:r>
               <a:rPr lang="en-US" dirty="0" err="1" smtClean="0"/>
-              <a:t>ageTLO</a:t>
+              <a:t>TLOage</a:t>
+            </a:r>
+            <a:r>
+              <a:rPr lang="en-US" dirty="0" smtClean="0">
+                <a:solidFill>
+                  <a:prstClr val="black"/>
+                </a:solidFill>
+                <a:sym typeface="Symbol"/>
+              </a:rPr>
+              <a:t> </a:t>
+            </a:r>
+            <a:r>
+              <a:rPr lang="en-US" dirty="0" smtClean="0">
+                <a:solidFill>
+                  <a:prstClr val="black"/>
+                </a:solidFill>
+                <a:sym typeface="Symbol"/>
+              </a:rPr>
+              <a:t></a:t>
+            </a:r>
+            <a:r>
+              <a:rPr lang="en-US" dirty="0" smtClean="0"/>
+              <a:t> age of the technology licensing office in years</a:t>
+            </a:r>
+          </a:p>
+          <a:p>
+            <a:pPr lvl="0"/>
+            <a:r>
+              <a:rPr lang="en-US" dirty="0" err="1" smtClean="0"/>
+              <a:t>TLOsize</a:t>
+            </a:r>
+            <a:r>
+              <a:rPr lang="en-US" dirty="0" smtClean="0"/>
+              <a:t> </a:t>
             </a:r>
             <a:r>
               <a:rPr lang="en-US" dirty="0">
@@ -13334,7 +13446,91 @@
                 </a:solidFill>
                 <a:sym typeface="Symbol"/>
               </a:rPr>
+              <a:t></a:t>
+            </a:r>
+            <a:r>
+              <a:rPr lang="en-US" dirty="0">
+                <a:solidFill>
+                  <a:prstClr val="black"/>
+                </a:solidFill>
+              </a:rPr>
               <a:t> </a:t>
+            </a:r>
+            <a:r>
+              <a:rPr lang="en-US" dirty="0" smtClean="0">
+                <a:solidFill>
+                  <a:prstClr val="black"/>
+                </a:solidFill>
+              </a:rPr>
+              <a:t>number of licensing staff in the </a:t>
+            </a:r>
+            <a:r>
+              <a:rPr lang="en-US" dirty="0">
+                <a:solidFill>
+                  <a:prstClr val="black"/>
+                </a:solidFill>
+              </a:rPr>
+              <a:t>technology licensing </a:t>
+            </a:r>
+            <a:r>
+              <a:rPr lang="en-US" dirty="0" smtClean="0">
+                <a:solidFill>
+                  <a:prstClr val="black"/>
+                </a:solidFill>
+              </a:rPr>
+              <a:t>office</a:t>
+            </a:r>
+            <a:endParaRPr lang="en-US" dirty="0" smtClean="0"/>
+          </a:p>
+          <a:p>
+            <a:pPr lvl="0"/>
+            <a:r>
+              <a:rPr lang="en-US" dirty="0" err="1" smtClean="0"/>
+              <a:t>pubPriv</a:t>
+            </a:r>
+            <a:r>
+              <a:rPr lang="en-US" dirty="0" smtClean="0"/>
+              <a:t> </a:t>
+            </a:r>
+            <a:r>
+              <a:rPr lang="en-US" dirty="0">
+                <a:solidFill>
+                  <a:prstClr val="black"/>
+                </a:solidFill>
+                <a:sym typeface="Symbol"/>
+              </a:rPr>
+              <a:t></a:t>
+            </a:r>
+            <a:r>
+              <a:rPr lang="en-US" dirty="0">
+                <a:solidFill>
+                  <a:prstClr val="black"/>
+                </a:solidFill>
+              </a:rPr>
+              <a:t> </a:t>
+            </a:r>
+            <a:r>
+              <a:rPr lang="en-US" dirty="0" smtClean="0">
+                <a:solidFill>
+                  <a:prstClr val="black"/>
+                </a:solidFill>
+              </a:rPr>
+              <a:t>whether the institution is a p</a:t>
+            </a:r>
+            <a:r>
+              <a:rPr lang="en-US" dirty="0" smtClean="0"/>
+              <a:t>ublic or private university (public = 1; private = 0)</a:t>
+            </a:r>
+            <a:endParaRPr lang="en-US" dirty="0"/>
+          </a:p>
+          <a:p>
+            <a:r>
+              <a:rPr lang="en-US" dirty="0" err="1"/>
+              <a:t>i</a:t>
+            </a:r>
+            <a:r>
+              <a:rPr lang="en-US" dirty="0" err="1" smtClean="0"/>
+              <a:t>ncub</a:t>
             </a:r>
             <a:r>
               <a:rPr lang="en-US" dirty="0" smtClean="0">
@@ -13343,22 +13539,7 @@
                 </a:solidFill>
                 <a:sym typeface="Symbol"/>
               </a:rPr>
-              <a:t></a:t>
-            </a:r>
-            <a:r>
-              <a:rPr lang="en-US" dirty="0" smtClean="0"/>
-              <a:t> age of the technology licensing office in years</a:t>
-            </a:r>
-          </a:p>
-          <a:p>
-            <a:pPr lvl="0"/>
-            <a:r>
-              <a:rPr lang="en-US" dirty="0" smtClean="0"/>
-              <a:t>TLO </a:t>
-            </a:r>
-            <a:r>
-              <a:rPr lang="en-US" dirty="0"/>
-              <a:t>size </a:t>
+              <a:t> </a:t>
             </a:r>
             <a:r>
               <a:rPr lang="en-US" dirty="0">
@@ -13368,95 +13549,6 @@
                 <a:sym typeface="Symbol"/>
               </a:rPr>
               <a:t></a:t>
-            </a:r>
-            <a:r>
-              <a:rPr lang="en-US" dirty="0">
-                <a:solidFill>
-                  <a:prstClr val="black"/>
-                </a:solidFill>
-              </a:rPr>
-              <a:t> </a:t>
-            </a:r>
-            <a:r>
-              <a:rPr lang="en-US" dirty="0" smtClean="0">
-                <a:solidFill>
-                  <a:prstClr val="black"/>
-                </a:solidFill>
-              </a:rPr>
-              <a:t>number of licensing staff in the </a:t>
-            </a:r>
-            <a:r>
-              <a:rPr lang="en-US" dirty="0">
-                <a:solidFill>
-                  <a:prstClr val="black"/>
-                </a:solidFill>
-              </a:rPr>
-              <a:t>technology licensing </a:t>
-            </a:r>
-            <a:r>
-              <a:rPr lang="en-US" dirty="0" smtClean="0">
-                <a:solidFill>
-                  <a:prstClr val="black"/>
-                </a:solidFill>
-              </a:rPr>
-              <a:t>office</a:t>
-            </a:r>
-            <a:endParaRPr lang="en-US" dirty="0" smtClean="0"/>
-          </a:p>
-          <a:p>
-            <a:pPr lvl="0"/>
-            <a:r>
-              <a:rPr lang="en-US" dirty="0" err="1" smtClean="0"/>
-              <a:t>pubPriv</a:t>
-            </a:r>
-            <a:r>
-              <a:rPr lang="en-US" dirty="0" smtClean="0"/>
-              <a:t> </a:t>
-            </a:r>
-            <a:r>
-              <a:rPr lang="en-US" dirty="0">
-                <a:solidFill>
-                  <a:prstClr val="black"/>
-                </a:solidFill>
-                <a:sym typeface="Symbol"/>
-              </a:rPr>
-              <a:t></a:t>
-            </a:r>
-            <a:r>
-              <a:rPr lang="en-US" dirty="0">
-                <a:solidFill>
-                  <a:prstClr val="black"/>
-                </a:solidFill>
-              </a:rPr>
-              <a:t> </a:t>
-            </a:r>
-            <a:r>
-              <a:rPr lang="en-US" dirty="0" smtClean="0">
-                <a:solidFill>
-                  <a:prstClr val="black"/>
-                </a:solidFill>
-              </a:rPr>
-              <a:t>whether the institution is a p</a:t>
-            </a:r>
-            <a:r>
-              <a:rPr lang="en-US" dirty="0" smtClean="0"/>
-              <a:t>ublic or private university (public = 1; private = 0)</a:t>
-            </a:r>
-            <a:endParaRPr lang="en-US" dirty="0"/>
-          </a:p>
-          <a:p>
-            <a:r>
-              <a:rPr lang="en-US" dirty="0" err="1" smtClean="0"/>
-              <a:t>Incub</a:t>
-            </a:r>
-            <a:r>
-              <a:rPr lang="en-US" dirty="0">
-                <a:solidFill>
-                  <a:prstClr val="black"/>
-                </a:solidFill>
-                <a:sym typeface="Symbol"/>
-              </a:rPr>
-              <a:t> </a:t>
             </a:r>
             <a:r>
               <a:rPr lang="en-US" dirty="0" smtClean="0"/>
@@ -13553,7 +13645,7 @@
         </p:blipFill>
         <p:spPr bwMode="auto">
           <a:xfrm>
-            <a:off x="2849870" y="544616"/>
+            <a:off x="2492670" y="544616"/>
             <a:ext cx="3463853" cy="4480560"/>
           </a:xfrm>
           <a:prstGeom prst="rect">
@@ -13591,15 +13683,7 @@
               <a:srgbClr val="969696"/>
             </a:contourClr>
           </a:sp3d>
-          <a:extLst>
-            <a:ext uri="{909E8E84-426E-40DD-AFC4-6F175D3DCCD1}">
-              <a14:hiddenFill xmlns:a14="http://schemas.microsoft.com/office/drawing/2010/main">
-                <a:solidFill>
-                  <a:schemeClr val="accent1"/>
-                </a:solidFill>
-              </a14:hiddenFill>
-            </a:ext>
-          </a:extLst>
+          <a:extLst/>
         </p:spPr>
       </p:pic>
       <p:sp>
@@ -13625,6 +13709,119 @@
           </a:p>
         </p:txBody>
       </p:sp>
+      <p:sp>
+        <p:nvSpPr>
+          <p:cNvPr id="4" name="TextBox 3"/>
+          <p:cNvSpPr txBox="1"/>
+          <p:nvPr/>
+        </p:nvSpPr>
+        <p:spPr>
+          <a:xfrm>
+            <a:off x="5879308" y="509354"/>
+            <a:ext cx="2843212" cy="369332"/>
+          </a:xfrm>
+          <a:prstGeom prst="rect">
+            <a:avLst/>
+          </a:prstGeom>
+          <a:noFill/>
+        </p:spPr>
+        <p:txBody>
+          <a:bodyPr wrap="square" rtlCol="0">
+            <a:spAutoFit/>
+          </a:bodyPr>
+          <a:lstStyle/>
+          <a:p>
+            <a:r>
+              <a:rPr lang="en-US" dirty="0" smtClean="0">
+                <a:solidFill>
+                  <a:srgbClr val="FF0000"/>
+                </a:solidFill>
+                <a:latin typeface="Comic Sans MS" panose="030F0702030302020204" pitchFamily="66" charset="0"/>
+              </a:rPr>
+              <a:t>FY1999 Survey was used</a:t>
+            </a:r>
+            <a:endParaRPr lang="en-US" dirty="0">
+              <a:solidFill>
+                <a:srgbClr val="FF0000"/>
+              </a:solidFill>
+              <a:latin typeface="Comic Sans MS" panose="030F0702030302020204" pitchFamily="66" charset="0"/>
+            </a:endParaRPr>
+          </a:p>
+        </p:txBody>
+      </p:sp>
+      <p:cxnSp>
+        <p:nvCxnSpPr>
+          <p:cNvPr id="6" name="Straight Connector 5"/>
+          <p:cNvCxnSpPr/>
+          <p:nvPr/>
+        </p:nvCxnSpPr>
+        <p:spPr>
+          <a:xfrm flipV="1">
+            <a:off x="4157650" y="1821656"/>
+            <a:ext cx="1285875" cy="257175"/>
+          </a:xfrm>
+          <a:prstGeom prst="line">
+            <a:avLst/>
+          </a:prstGeom>
+          <a:ln w="44450">
+            <a:solidFill>
+              <a:srgbClr val="FF0000"/>
+            </a:solidFill>
+          </a:ln>
+        </p:spPr>
+        <p:style>
+          <a:lnRef idx="1">
+            <a:schemeClr val="accent1"/>
+          </a:lnRef>
+          <a:fillRef idx="0">
+            <a:schemeClr val="accent1"/>
+          </a:fillRef>
+          <a:effectRef idx="0">
+            <a:schemeClr val="accent1"/>
+          </a:effectRef>
+          <a:fontRef idx="minor">
+            <a:schemeClr val="tx1"/>
+          </a:fontRef>
+        </p:style>
+      </p:cxnSp>
+      <p:cxnSp>
+        <p:nvCxnSpPr>
+          <p:cNvPr id="16" name="Curved Connector 15"/>
+          <p:cNvCxnSpPr/>
+          <p:nvPr/>
+        </p:nvCxnSpPr>
+        <p:spPr>
+          <a:xfrm rot="5400000">
+            <a:off x="5559664" y="903292"/>
+            <a:ext cx="766525" cy="741599"/>
+          </a:xfrm>
+          <a:prstGeom prst="curvedConnector3">
+            <a:avLst>
+              <a:gd name="adj1" fmla="val 50000"/>
+            </a:avLst>
+          </a:prstGeom>
+          <a:ln w="28575">
+            <a:solidFill>
+              <a:srgbClr val="FF0000"/>
+            </a:solidFill>
+            <a:tailEnd type="arrow"/>
+          </a:ln>
+        </p:spPr>
+        <p:style>
+          <a:lnRef idx="1">
+            <a:schemeClr val="accent1"/>
+          </a:lnRef>
+          <a:fillRef idx="0">
+            <a:schemeClr val="accent1"/>
+          </a:fillRef>
+          <a:effectRef idx="0">
+            <a:schemeClr val="accent1"/>
+          </a:effectRef>
+          <a:fontRef idx="minor">
+            <a:schemeClr val="tx1"/>
+          </a:fontRef>
+        </p:style>
+      </p:cxnSp>
     </p:spTree>
     <p:extLst>
       <p:ext uri="{BB962C8B-B14F-4D97-AF65-F5344CB8AC3E}">

</xml_diff>